<commit_message>
Updated diagrams and minor PPP edits.
</commit_message>
<xml_diff>
--- a/docs/diagrams/StorageComponentClassDiagram.pptx
+++ b/docs/diagrams/StorageComponentClassDiagram.pptx
@@ -129,7 +129,7 @@
 <file path=ppt/revisionInfo.xml><?xml version="1.0" encoding="utf-8"?>
 <p1510:revInfo xmlns:a="http://schemas.openxmlformats.org/drawingml/2006/main" xmlns:r="http://schemas.openxmlformats.org/officeDocument/2006/relationships" xmlns:p1510="http://schemas.microsoft.com/office/powerpoint/2015/10/main">
   <p1510:revLst>
-    <p1510:client id="{E98F4D69-3910-42B5-8F83-489B37FDB09D}" v="7" dt="2018-10-29T03:45:49.799"/>
+    <p1510:client id="{E98F4D69-3910-42B5-8F83-489B37FDB09D}" v="9" dt="2018-11-05T14:29:36.188"/>
   </p1510:revLst>
 </p1510:revInfo>
 </file>
@@ -472,6 +472,78 @@
       </pc:sldChg>
     </pc:docChg>
   </pc:docChgLst>
+  <pc:docChgLst>
+    <pc:chgData name="Ho Zong Sien" userId="03515f1a-cd05-4b48-bd07-e232f2fd8730" providerId="ADAL" clId="{E98F4D69-3910-42B5-8F83-489B37FDB09D}"/>
+    <pc:docChg chg="undo custSel modSld">
+      <pc:chgData name="Ho Zong Sien" userId="03515f1a-cd05-4b48-bd07-e232f2fd8730" providerId="ADAL" clId="{E98F4D69-3910-42B5-8F83-489B37FDB09D}" dt="2018-11-05T14:30:11.757" v="39" actId="14100"/>
+      <pc:docMkLst>
+        <pc:docMk/>
+      </pc:docMkLst>
+      <pc:sldChg chg="addSp delSp modSp">
+        <pc:chgData name="Ho Zong Sien" userId="03515f1a-cd05-4b48-bd07-e232f2fd8730" providerId="ADAL" clId="{E98F4D69-3910-42B5-8F83-489B37FDB09D}" dt="2018-11-05T14:30:11.757" v="39" actId="14100"/>
+        <pc:sldMkLst>
+          <pc:docMk/>
+          <pc:sldMk cId="1478832369" sldId="264"/>
+        </pc:sldMkLst>
+        <pc:spChg chg="add mod">
+          <ac:chgData name="Ho Zong Sien" userId="03515f1a-cd05-4b48-bd07-e232f2fd8730" providerId="ADAL" clId="{E98F4D69-3910-42B5-8F83-489B37FDB09D}" dt="2018-11-05T14:28:26.539" v="22" actId="1076"/>
+          <ac:spMkLst>
+            <pc:docMk/>
+            <pc:sldMk cId="1478832369" sldId="264"/>
+            <ac:spMk id="39" creationId="{5C4F05C6-9C81-49EA-A111-45C3E6B81820}"/>
+          </ac:spMkLst>
+        </pc:spChg>
+        <pc:spChg chg="add mod">
+          <ac:chgData name="Ho Zong Sien" userId="03515f1a-cd05-4b48-bd07-e232f2fd8730" providerId="ADAL" clId="{E98F4D69-3910-42B5-8F83-489B37FDB09D}" dt="2018-11-05T14:28:56.901" v="27" actId="1076"/>
+          <ac:spMkLst>
+            <pc:docMk/>
+            <pc:sldMk cId="1478832369" sldId="264"/>
+            <ac:spMk id="43" creationId="{3CE2BCF9-D8F1-4F92-8334-833F24F0B035}"/>
+          </ac:spMkLst>
+        </pc:spChg>
+        <pc:spChg chg="del mod">
+          <ac:chgData name="Ho Zong Sien" userId="03515f1a-cd05-4b48-bd07-e232f2fd8730" providerId="ADAL" clId="{E98F4D69-3910-42B5-8F83-489B37FDB09D}" dt="2018-11-05T14:26:48.345" v="1" actId="478"/>
+          <ac:spMkLst>
+            <pc:docMk/>
+            <pc:sldMk cId="1478832369" sldId="264"/>
+            <ac:spMk id="46" creationId="{FAFB94BA-85FD-41A7-9D1C-DD931A25F0E3}"/>
+          </ac:spMkLst>
+        </pc:spChg>
+        <pc:spChg chg="mod">
+          <ac:chgData name="Ho Zong Sien" userId="03515f1a-cd05-4b48-bd07-e232f2fd8730" providerId="ADAL" clId="{E98F4D69-3910-42B5-8F83-489B37FDB09D}" dt="2018-11-05T14:28:33.311" v="24" actId="1076"/>
+          <ac:spMkLst>
+            <pc:docMk/>
+            <pc:sldMk cId="1478832369" sldId="264"/>
+            <ac:spMk id="118" creationId="{00000000-0000-0000-0000-000000000000}"/>
+          </ac:spMkLst>
+        </pc:spChg>
+        <pc:cxnChg chg="add mod">
+          <ac:chgData name="Ho Zong Sien" userId="03515f1a-cd05-4b48-bd07-e232f2fd8730" providerId="ADAL" clId="{E98F4D69-3910-42B5-8F83-489B37FDB09D}" dt="2018-11-05T14:30:06.970" v="38" actId="14100"/>
+          <ac:cxnSpMkLst>
+            <pc:docMk/>
+            <pc:sldMk cId="1478832369" sldId="264"/>
+            <ac:cxnSpMk id="40" creationId="{1EC10A1E-C88A-4435-9AF1-B78267DF0666}"/>
+          </ac:cxnSpMkLst>
+        </pc:cxnChg>
+        <pc:cxnChg chg="add mod">
+          <ac:chgData name="Ho Zong Sien" userId="03515f1a-cd05-4b48-bd07-e232f2fd8730" providerId="ADAL" clId="{E98F4D69-3910-42B5-8F83-489B37FDB09D}" dt="2018-11-05T14:30:11.757" v="39" actId="14100"/>
+          <ac:cxnSpMkLst>
+            <pc:docMk/>
+            <pc:sldMk cId="1478832369" sldId="264"/>
+            <ac:cxnSpMk id="44" creationId="{E573CBC6-5DB6-49A6-98BE-3FB44F30394E}"/>
+          </ac:cxnSpMkLst>
+        </pc:cxnChg>
+        <pc:cxnChg chg="del mod">
+          <ac:chgData name="Ho Zong Sien" userId="03515f1a-cd05-4b48-bd07-e232f2fd8730" providerId="ADAL" clId="{E98F4D69-3910-42B5-8F83-489B37FDB09D}" dt="2018-11-05T14:26:51.136" v="2" actId="478"/>
+          <ac:cxnSpMkLst>
+            <pc:docMk/>
+            <pc:sldMk cId="1478832369" sldId="264"/>
+            <ac:cxnSpMk id="47" creationId="{A3FEEEFF-4A08-41BE-8330-29B74AD7C952}"/>
+          </ac:cxnSpMkLst>
+        </pc:cxnChg>
+      </pc:sldChg>
+    </pc:docChg>
+  </pc:docChgLst>
 </pc:chgInfo>
 </file>
 
@@ -557,7 +629,7 @@
           <a:p>
             <a:fld id="{F5CC4B3F-88C1-4FFA-B1B6-F41C21DC6924}" type="datetimeFigureOut">
               <a:rPr lang="en-US" smtClean="0"/>
-              <a:t>10/29/2018</a:t>
+              <a:t>11/5/2018</a:t>
             </a:fld>
             <a:endParaRPr lang="en-US"/>
           </a:p>
@@ -1003,7 +1075,7 @@
           <a:p>
             <a:fld id="{78C97017-6FC3-485B-9764-EAC9E56C1D49}" type="datetimeFigureOut">
               <a:rPr lang="en-US" smtClean="0"/>
-              <a:t>10/29/2018</a:t>
+              <a:t>11/5/2018</a:t>
             </a:fld>
             <a:endParaRPr lang="en-US"/>
           </a:p>
@@ -1171,7 +1243,7 @@
           <a:p>
             <a:fld id="{78C97017-6FC3-485B-9764-EAC9E56C1D49}" type="datetimeFigureOut">
               <a:rPr lang="en-US" smtClean="0"/>
-              <a:t>10/29/2018</a:t>
+              <a:t>11/5/2018</a:t>
             </a:fld>
             <a:endParaRPr lang="en-US"/>
           </a:p>
@@ -1349,7 +1421,7 @@
           <a:p>
             <a:fld id="{78C97017-6FC3-485B-9764-EAC9E56C1D49}" type="datetimeFigureOut">
               <a:rPr lang="en-US" smtClean="0"/>
-              <a:t>10/29/2018</a:t>
+              <a:t>11/5/2018</a:t>
             </a:fld>
             <a:endParaRPr lang="en-US"/>
           </a:p>
@@ -1517,7 +1589,7 @@
           <a:p>
             <a:fld id="{78C97017-6FC3-485B-9764-EAC9E56C1D49}" type="datetimeFigureOut">
               <a:rPr lang="en-US" smtClean="0"/>
-              <a:t>10/29/2018</a:t>
+              <a:t>11/5/2018</a:t>
             </a:fld>
             <a:endParaRPr lang="en-US"/>
           </a:p>
@@ -1762,7 +1834,7 @@
           <a:p>
             <a:fld id="{78C97017-6FC3-485B-9764-EAC9E56C1D49}" type="datetimeFigureOut">
               <a:rPr lang="en-US" smtClean="0"/>
-              <a:t>10/29/2018</a:t>
+              <a:t>11/5/2018</a:t>
             </a:fld>
             <a:endParaRPr lang="en-US"/>
           </a:p>
@@ -2047,7 +2119,7 @@
           <a:p>
             <a:fld id="{78C97017-6FC3-485B-9764-EAC9E56C1D49}" type="datetimeFigureOut">
               <a:rPr lang="en-US" smtClean="0"/>
-              <a:t>10/29/2018</a:t>
+              <a:t>11/5/2018</a:t>
             </a:fld>
             <a:endParaRPr lang="en-US"/>
           </a:p>
@@ -2466,7 +2538,7 @@
           <a:p>
             <a:fld id="{78C97017-6FC3-485B-9764-EAC9E56C1D49}" type="datetimeFigureOut">
               <a:rPr lang="en-US" smtClean="0"/>
-              <a:t>10/29/2018</a:t>
+              <a:t>11/5/2018</a:t>
             </a:fld>
             <a:endParaRPr lang="en-US"/>
           </a:p>
@@ -2583,7 +2655,7 @@
           <a:p>
             <a:fld id="{78C97017-6FC3-485B-9764-EAC9E56C1D49}" type="datetimeFigureOut">
               <a:rPr lang="en-US" smtClean="0"/>
-              <a:t>10/29/2018</a:t>
+              <a:t>11/5/2018</a:t>
             </a:fld>
             <a:endParaRPr lang="en-US"/>
           </a:p>
@@ -2678,7 +2750,7 @@
           <a:p>
             <a:fld id="{78C97017-6FC3-485B-9764-EAC9E56C1D49}" type="datetimeFigureOut">
               <a:rPr lang="en-US" smtClean="0"/>
-              <a:t>10/29/2018</a:t>
+              <a:t>11/5/2018</a:t>
             </a:fld>
             <a:endParaRPr lang="en-US"/>
           </a:p>
@@ -2953,7 +3025,7 @@
           <a:p>
             <a:fld id="{78C97017-6FC3-485B-9764-EAC9E56C1D49}" type="datetimeFigureOut">
               <a:rPr lang="en-US" smtClean="0"/>
-              <a:t>10/29/2018</a:t>
+              <a:t>11/5/2018</a:t>
             </a:fld>
             <a:endParaRPr lang="en-US"/>
           </a:p>
@@ -3205,7 +3277,7 @@
           <a:p>
             <a:fld id="{78C97017-6FC3-485B-9764-EAC9E56C1D49}" type="datetimeFigureOut">
               <a:rPr lang="en-US" smtClean="0"/>
-              <a:t>10/29/2018</a:t>
+              <a:t>11/5/2018</a:t>
             </a:fld>
             <a:endParaRPr lang="en-US"/>
           </a:p>
@@ -3416,7 +3488,7 @@
           <a:p>
             <a:fld id="{78C97017-6FC3-485B-9764-EAC9E56C1D49}" type="datetimeFigureOut">
               <a:rPr lang="en-US" smtClean="0"/>
-              <a:t>10/29/2018</a:t>
+              <a:t>11/5/2018</a:t>
             </a:fld>
             <a:endParaRPr lang="en-US"/>
           </a:p>
@@ -5621,118 +5693,6 @@
           </a:fontRef>
         </p:style>
       </p:cxnSp>
-      <p:sp>
-        <p:nvSpPr>
-          <p:cNvPr id="46" name="Isosceles Triangle 102">
-            <a:extLst>
-              <a:ext uri="{FF2B5EF4-FFF2-40B4-BE49-F238E27FC236}">
-                <a16:creationId xmlns:a16="http://schemas.microsoft.com/office/drawing/2014/main" id="{FAFB94BA-85FD-41A7-9D1C-DD931A25F0E3}"/>
-              </a:ext>
-            </a:extLst>
-          </p:cNvPr>
-          <p:cNvSpPr/>
-          <p:nvPr/>
-        </p:nvSpPr>
-        <p:spPr>
-          <a:xfrm rot="10800000" flipV="1">
-            <a:off x="2813750" y="3492208"/>
-            <a:ext cx="270504" cy="175523"/>
-          </a:xfrm>
-          <a:prstGeom prst="triangle">
-            <a:avLst/>
-          </a:prstGeom>
-          <a:solidFill>
-            <a:schemeClr val="accent6">
-              <a:lumMod val="75000"/>
-            </a:schemeClr>
-          </a:solidFill>
-          <a:ln w="19050">
-            <a:solidFill>
-              <a:schemeClr val="accent6">
-                <a:lumMod val="75000"/>
-              </a:schemeClr>
-            </a:solidFill>
-          </a:ln>
-          <a:effectLst/>
-        </p:spPr>
-        <p:style>
-          <a:lnRef idx="1">
-            <a:schemeClr val="accent2"/>
-          </a:lnRef>
-          <a:fillRef idx="2">
-            <a:schemeClr val="accent2"/>
-          </a:fillRef>
-          <a:effectRef idx="1">
-            <a:schemeClr val="accent2"/>
-          </a:effectRef>
-          <a:fontRef idx="minor">
-            <a:schemeClr val="dk1"/>
-          </a:fontRef>
-        </p:style>
-        <p:txBody>
-          <a:bodyPr rtlCol="0" anchor="ctr"/>
-          <a:lstStyle/>
-          <a:p>
-            <a:pPr algn="ctr"/>
-            <a:endParaRPr lang="en-SG" sz="1050">
-              <a:solidFill>
-                <a:schemeClr val="bg1"/>
-              </a:solidFill>
-            </a:endParaRPr>
-          </a:p>
-        </p:txBody>
-      </p:sp>
-      <p:cxnSp>
-        <p:nvCxnSpPr>
-          <p:cNvPr id="47" name="Elbow Connector 63">
-            <a:extLst>
-              <a:ext uri="{FF2B5EF4-FFF2-40B4-BE49-F238E27FC236}">
-                <a16:creationId xmlns:a16="http://schemas.microsoft.com/office/drawing/2014/main" id="{A3FEEEFF-4A08-41BE-8330-29B74AD7C952}"/>
-              </a:ext>
-            </a:extLst>
-          </p:cNvPr>
-          <p:cNvCxnSpPr>
-            <a:cxnSpLocks/>
-            <a:stCxn id="46" idx="3"/>
-            <a:endCxn id="33" idx="1"/>
-          </p:cNvCxnSpPr>
-          <p:nvPr/>
-        </p:nvCxnSpPr>
-        <p:spPr>
-          <a:xfrm rot="16200000" flipH="1">
-            <a:off x="3058670" y="3558063"/>
-            <a:ext cx="860213" cy="1079548"/>
-          </a:xfrm>
-          <a:prstGeom prst="bentConnector2">
-            <a:avLst/>
-          </a:prstGeom>
-          <a:ln w="19050">
-            <a:solidFill>
-              <a:schemeClr val="accent6">
-                <a:lumMod val="75000"/>
-              </a:schemeClr>
-            </a:solidFill>
-            <a:prstDash val="sysDot"/>
-            <a:headEnd type="none" w="med" len="med"/>
-            <a:tailEnd type="none" w="med" len="med"/>
-          </a:ln>
-          <a:effectLst/>
-        </p:spPr>
-        <p:style>
-          <a:lnRef idx="1">
-            <a:schemeClr val="accent2"/>
-          </a:lnRef>
-          <a:fillRef idx="2">
-            <a:schemeClr val="accent2"/>
-          </a:fillRef>
-          <a:effectRef idx="1">
-            <a:schemeClr val="accent2"/>
-          </a:effectRef>
-          <a:fontRef idx="minor">
-            <a:schemeClr val="dk1"/>
-          </a:fontRef>
-        </p:style>
-      </p:cxnSp>
       <p:cxnSp>
         <p:nvCxnSpPr>
           <p:cNvPr id="41" name="Elbow Connector 122">
@@ -5775,6 +5735,244 @@
           </a:fillRef>
           <a:effectRef idx="1">
             <a:schemeClr val="accent6"/>
+          </a:effectRef>
+          <a:fontRef idx="minor">
+            <a:schemeClr val="dk1"/>
+          </a:fontRef>
+        </p:style>
+      </p:cxnSp>
+      <p:sp>
+        <p:nvSpPr>
+          <p:cNvPr id="39" name="Rectangle 8">
+            <a:extLst>
+              <a:ext uri="{FF2B5EF4-FFF2-40B4-BE49-F238E27FC236}">
+                <a16:creationId xmlns:a16="http://schemas.microsoft.com/office/drawing/2014/main" id="{5C4F05C6-9C81-49EA-A111-45C3E6B81820}"/>
+              </a:ext>
+            </a:extLst>
+          </p:cNvPr>
+          <p:cNvSpPr/>
+          <p:nvPr/>
+        </p:nvSpPr>
+        <p:spPr>
+          <a:xfrm>
+            <a:off x="2287478" y="4354564"/>
+            <a:ext cx="1323049" cy="346760"/>
+          </a:xfrm>
+          <a:prstGeom prst="rect">
+            <a:avLst/>
+          </a:prstGeom>
+          <a:solidFill>
+            <a:schemeClr val="accent6">
+              <a:lumMod val="75000"/>
+            </a:schemeClr>
+          </a:solidFill>
+          <a:ln w="19050">
+            <a:solidFill>
+              <a:schemeClr val="accent6">
+                <a:lumMod val="75000"/>
+              </a:schemeClr>
+            </a:solidFill>
+          </a:ln>
+          <a:effectLst/>
+        </p:spPr>
+        <p:style>
+          <a:lnRef idx="1">
+            <a:schemeClr val="accent2"/>
+          </a:lnRef>
+          <a:fillRef idx="2">
+            <a:schemeClr val="accent2"/>
+          </a:fillRef>
+          <a:effectRef idx="1">
+            <a:schemeClr val="accent2"/>
+          </a:effectRef>
+          <a:fontRef idx="minor">
+            <a:schemeClr val="dk1"/>
+          </a:fontRef>
+        </p:style>
+        <p:txBody>
+          <a:bodyPr rtlCol="0" anchor="ctr"/>
+          <a:lstStyle/>
+          <a:p>
+            <a:pPr algn="ctr"/>
+            <a:r>
+              <a:rPr lang="en-US" sz="1050" dirty="0">
+                <a:solidFill>
+                  <a:schemeClr val="bg1"/>
+                </a:solidFill>
+              </a:rPr>
+              <a:t>&lt;&lt;interface&gt;&gt;</a:t>
+            </a:r>
+            <a:br>
+              <a:rPr lang="en-US" sz="1050" dirty="0">
+                <a:solidFill>
+                  <a:schemeClr val="bg1"/>
+                </a:solidFill>
+              </a:rPr>
+            </a:br>
+            <a:r>
+              <a:rPr lang="en-US" sz="1050" dirty="0" err="1">
+                <a:solidFill>
+                  <a:schemeClr val="bg1"/>
+                </a:solidFill>
+              </a:rPr>
+              <a:t>TriviaResultsStorage</a:t>
+            </a:r>
+            <a:endParaRPr lang="en-SG" sz="1050" dirty="0">
+              <a:solidFill>
+                <a:schemeClr val="bg1"/>
+              </a:solidFill>
+            </a:endParaRPr>
+          </a:p>
+        </p:txBody>
+      </p:sp>
+      <p:cxnSp>
+        <p:nvCxnSpPr>
+          <p:cNvPr id="40" name="Straight Arrow Connector 39">
+            <a:extLst>
+              <a:ext uri="{FF2B5EF4-FFF2-40B4-BE49-F238E27FC236}">
+                <a16:creationId xmlns:a16="http://schemas.microsoft.com/office/drawing/2014/main" id="{1EC10A1E-C88A-4435-9AF1-B78267DF0666}"/>
+              </a:ext>
+            </a:extLst>
+          </p:cNvPr>
+          <p:cNvCxnSpPr>
+            <a:cxnSpLocks/>
+          </p:cNvCxnSpPr>
+          <p:nvPr/>
+        </p:nvCxnSpPr>
+        <p:spPr>
+          <a:xfrm>
+            <a:off x="1644315" y="4524150"/>
+            <a:ext cx="643163" cy="0"/>
+          </a:xfrm>
+          <a:prstGeom prst="straightConnector1">
+            <a:avLst/>
+          </a:prstGeom>
+          <a:ln w="19050">
+            <a:solidFill>
+              <a:schemeClr val="accent6">
+                <a:lumMod val="75000"/>
+              </a:schemeClr>
+            </a:solidFill>
+            <a:headEnd type="none" w="med" len="med"/>
+            <a:tailEnd type="arrow" w="med" len="med"/>
+          </a:ln>
+          <a:effectLst/>
+        </p:spPr>
+        <p:style>
+          <a:lnRef idx="1">
+            <a:schemeClr val="accent2"/>
+          </a:lnRef>
+          <a:fillRef idx="2">
+            <a:schemeClr val="accent2"/>
+          </a:fillRef>
+          <a:effectRef idx="1">
+            <a:schemeClr val="accent2"/>
+          </a:effectRef>
+          <a:fontRef idx="minor">
+            <a:schemeClr val="dk1"/>
+          </a:fontRef>
+        </p:style>
+      </p:cxnSp>
+      <p:sp>
+        <p:nvSpPr>
+          <p:cNvPr id="43" name="Flowchart: Decision 96">
+            <a:extLst>
+              <a:ext uri="{FF2B5EF4-FFF2-40B4-BE49-F238E27FC236}">
+                <a16:creationId xmlns:a16="http://schemas.microsoft.com/office/drawing/2014/main" id="{3CE2BCF9-D8F1-4F92-8334-833F24F0B035}"/>
+              </a:ext>
+            </a:extLst>
+          </p:cNvPr>
+          <p:cNvSpPr/>
+          <p:nvPr/>
+        </p:nvSpPr>
+        <p:spPr>
+          <a:xfrm rot="5400000">
+            <a:off x="1526291" y="3591237"/>
+            <a:ext cx="236048" cy="173380"/>
+          </a:xfrm>
+          <a:prstGeom prst="flowChartDecision">
+            <a:avLst/>
+          </a:prstGeom>
+          <a:noFill/>
+          <a:ln w="19050">
+            <a:solidFill>
+              <a:schemeClr val="accent6">
+                <a:lumMod val="75000"/>
+              </a:schemeClr>
+            </a:solidFill>
+          </a:ln>
+          <a:effectLst/>
+        </p:spPr>
+        <p:style>
+          <a:lnRef idx="1">
+            <a:schemeClr val="accent2"/>
+          </a:lnRef>
+          <a:fillRef idx="2">
+            <a:schemeClr val="accent2"/>
+          </a:fillRef>
+          <a:effectRef idx="1">
+            <a:schemeClr val="accent2"/>
+          </a:effectRef>
+          <a:fontRef idx="minor">
+            <a:schemeClr val="dk1"/>
+          </a:fontRef>
+        </p:style>
+        <p:txBody>
+          <a:bodyPr rtlCol="0" anchor="ctr"/>
+          <a:lstStyle/>
+          <a:p>
+            <a:pPr algn="ctr"/>
+            <a:endParaRPr lang="en-US" sz="1050">
+              <a:solidFill>
+                <a:schemeClr val="bg1"/>
+              </a:solidFill>
+            </a:endParaRPr>
+          </a:p>
+        </p:txBody>
+      </p:sp>
+      <p:cxnSp>
+        <p:nvCxnSpPr>
+          <p:cNvPr id="44" name="Straight Arrow Connector 43">
+            <a:extLst>
+              <a:ext uri="{FF2B5EF4-FFF2-40B4-BE49-F238E27FC236}">
+                <a16:creationId xmlns:a16="http://schemas.microsoft.com/office/drawing/2014/main" id="{E573CBC6-5DB6-49A6-98BE-3FB44F30394E}"/>
+              </a:ext>
+            </a:extLst>
+          </p:cNvPr>
+          <p:cNvCxnSpPr>
+            <a:cxnSpLocks/>
+            <a:stCxn id="43" idx="3"/>
+          </p:cNvCxnSpPr>
+          <p:nvPr/>
+        </p:nvCxnSpPr>
+        <p:spPr>
+          <a:xfrm>
+            <a:off x="1644315" y="3795951"/>
+            <a:ext cx="0" cy="736191"/>
+          </a:xfrm>
+          <a:prstGeom prst="straightConnector1">
+            <a:avLst/>
+          </a:prstGeom>
+          <a:ln w="19050">
+            <a:solidFill>
+              <a:schemeClr val="accent6">
+                <a:lumMod val="75000"/>
+              </a:schemeClr>
+            </a:solidFill>
+            <a:headEnd type="none" w="med" len="med"/>
+            <a:tailEnd type="none" w="med" len="med"/>
+          </a:ln>
+          <a:effectLst/>
+        </p:spPr>
+        <p:style>
+          <a:lnRef idx="1">
+            <a:schemeClr val="accent2"/>
+          </a:lnRef>
+          <a:fillRef idx="2">
+            <a:schemeClr val="accent2"/>
+          </a:fillRef>
+          <a:effectRef idx="1">
+            <a:schemeClr val="accent2"/>
           </a:effectRef>
           <a:fontRef idx="minor">
             <a:schemeClr val="dk1"/>

</xml_diff>

<commit_message>
Corrected Storage class diagram
</commit_message>
<xml_diff>
--- a/docs/diagrams/StorageComponentClassDiagram.pptx
+++ b/docs/diagrams/StorageComponentClassDiagram.pptx
@@ -129,7 +129,7 @@
 <file path=ppt/revisionInfo.xml><?xml version="1.0" encoding="utf-8"?>
 <p1510:revInfo xmlns:a="http://schemas.openxmlformats.org/drawingml/2006/main" xmlns:r="http://schemas.openxmlformats.org/officeDocument/2006/relationships" xmlns:p1510="http://schemas.microsoft.com/office/powerpoint/2015/10/main">
   <p1510:revLst>
-    <p1510:client id="{E98F4D69-3910-42B5-8F83-489B37FDB09D}" v="9" dt="2018-11-05T14:29:36.188"/>
+    <p1510:client id="{E98F4D69-3910-42B5-8F83-489B37FDB09D}" v="10" dt="2018-11-05T15:44:21.726"/>
   </p1510:revLst>
 </p1510:revInfo>
 </file>
@@ -475,12 +475,12 @@
   <pc:docChgLst>
     <pc:chgData name="Ho Zong Sien" userId="03515f1a-cd05-4b48-bd07-e232f2fd8730" providerId="ADAL" clId="{E98F4D69-3910-42B5-8F83-489B37FDB09D}"/>
     <pc:docChg chg="undo custSel modSld">
-      <pc:chgData name="Ho Zong Sien" userId="03515f1a-cd05-4b48-bd07-e232f2fd8730" providerId="ADAL" clId="{E98F4D69-3910-42B5-8F83-489B37FDB09D}" dt="2018-11-05T14:30:11.757" v="39" actId="14100"/>
+      <pc:chgData name="Ho Zong Sien" userId="03515f1a-cd05-4b48-bd07-e232f2fd8730" providerId="ADAL" clId="{E98F4D69-3910-42B5-8F83-489B37FDB09D}" dt="2018-11-05T15:44:48.766" v="42" actId="1076"/>
       <pc:docMkLst>
         <pc:docMk/>
       </pc:docMkLst>
       <pc:sldChg chg="addSp delSp modSp">
-        <pc:chgData name="Ho Zong Sien" userId="03515f1a-cd05-4b48-bd07-e232f2fd8730" providerId="ADAL" clId="{E98F4D69-3910-42B5-8F83-489B37FDB09D}" dt="2018-11-05T14:30:11.757" v="39" actId="14100"/>
+        <pc:chgData name="Ho Zong Sien" userId="03515f1a-cd05-4b48-bd07-e232f2fd8730" providerId="ADAL" clId="{E98F4D69-3910-42B5-8F83-489B37FDB09D}" dt="2018-11-05T15:44:48.766" v="42" actId="1076"/>
         <pc:sldMkLst>
           <pc:docMk/>
           <pc:sldMk cId="1478832369" sldId="264"/>
@@ -499,6 +499,14 @@
             <pc:docMk/>
             <pc:sldMk cId="1478832369" sldId="264"/>
             <ac:spMk id="43" creationId="{3CE2BCF9-D8F1-4F92-8334-833F24F0B035}"/>
+          </ac:spMkLst>
+        </pc:spChg>
+        <pc:spChg chg="add mod">
+          <ac:chgData name="Ho Zong Sien" userId="03515f1a-cd05-4b48-bd07-e232f2fd8730" providerId="ADAL" clId="{E98F4D69-3910-42B5-8F83-489B37FDB09D}" dt="2018-11-05T15:44:48.766" v="42" actId="1076"/>
+          <ac:spMkLst>
+            <pc:docMk/>
+            <pc:sldMk cId="1478832369" sldId="264"/>
+            <ac:spMk id="46" creationId="{7B2F2344-B820-4913-918B-2BF493A24518}"/>
           </ac:spMkLst>
         </pc:spChg>
         <pc:spChg chg="del mod">
@@ -531,6 +539,14 @@
             <pc:docMk/>
             <pc:sldMk cId="1478832369" sldId="264"/>
             <ac:cxnSpMk id="44" creationId="{E573CBC6-5DB6-49A6-98BE-3FB44F30394E}"/>
+          </ac:cxnSpMkLst>
+        </pc:cxnChg>
+        <pc:cxnChg chg="add mod">
+          <ac:chgData name="Ho Zong Sien" userId="03515f1a-cd05-4b48-bd07-e232f2fd8730" providerId="ADAL" clId="{E98F4D69-3910-42B5-8F83-489B37FDB09D}" dt="2018-11-05T15:44:48.766" v="42" actId="1076"/>
+          <ac:cxnSpMkLst>
+            <pc:docMk/>
+            <pc:sldMk cId="1478832369" sldId="264"/>
+            <ac:cxnSpMk id="45" creationId="{6274C1DA-131F-40DB-8132-F394781A8617}"/>
           </ac:cxnSpMkLst>
         </pc:cxnChg>
         <pc:cxnChg chg="del mod">
@@ -5979,6 +5995,118 @@
           </a:fontRef>
         </p:style>
       </p:cxnSp>
+      <p:cxnSp>
+        <p:nvCxnSpPr>
+          <p:cNvPr id="45" name="Elbow Connector 63">
+            <a:extLst>
+              <a:ext uri="{FF2B5EF4-FFF2-40B4-BE49-F238E27FC236}">
+                <a16:creationId xmlns:a16="http://schemas.microsoft.com/office/drawing/2014/main" id="{6274C1DA-131F-40DB-8132-F394781A8617}"/>
+              </a:ext>
+            </a:extLst>
+          </p:cNvPr>
+          <p:cNvCxnSpPr>
+            <a:stCxn id="46" idx="3"/>
+          </p:cNvCxnSpPr>
+          <p:nvPr/>
+        </p:nvCxnSpPr>
+        <p:spPr>
+          <a:xfrm flipV="1">
+            <a:off x="3803572" y="4532142"/>
+            <a:ext cx="223324" cy="1"/>
+          </a:xfrm>
+          <a:prstGeom prst="bentConnector3">
+            <a:avLst>
+              <a:gd name="adj1" fmla="val 50000"/>
+            </a:avLst>
+          </a:prstGeom>
+          <a:ln w="19050">
+            <a:solidFill>
+              <a:schemeClr val="accent6">
+                <a:lumMod val="75000"/>
+              </a:schemeClr>
+            </a:solidFill>
+            <a:prstDash val="sysDot"/>
+            <a:headEnd type="none" w="med" len="med"/>
+            <a:tailEnd type="none" w="med" len="med"/>
+          </a:ln>
+          <a:effectLst/>
+        </p:spPr>
+        <p:style>
+          <a:lnRef idx="1">
+            <a:schemeClr val="accent2"/>
+          </a:lnRef>
+          <a:fillRef idx="2">
+            <a:schemeClr val="accent2"/>
+          </a:fillRef>
+          <a:effectRef idx="1">
+            <a:schemeClr val="accent2"/>
+          </a:effectRef>
+          <a:fontRef idx="minor">
+            <a:schemeClr val="dk1"/>
+          </a:fontRef>
+        </p:style>
+      </p:cxnSp>
+      <p:sp>
+        <p:nvSpPr>
+          <p:cNvPr id="46" name="Isosceles Triangle 102">
+            <a:extLst>
+              <a:ext uri="{FF2B5EF4-FFF2-40B4-BE49-F238E27FC236}">
+                <a16:creationId xmlns:a16="http://schemas.microsoft.com/office/drawing/2014/main" id="{7B2F2344-B820-4913-918B-2BF493A24518}"/>
+              </a:ext>
+            </a:extLst>
+          </p:cNvPr>
+          <p:cNvSpPr/>
+          <p:nvPr/>
+        </p:nvSpPr>
+        <p:spPr>
+          <a:xfrm rot="5400000" flipV="1">
+            <a:off x="3580558" y="4444381"/>
+            <a:ext cx="270504" cy="175523"/>
+          </a:xfrm>
+          <a:prstGeom prst="triangle">
+            <a:avLst/>
+          </a:prstGeom>
+          <a:solidFill>
+            <a:schemeClr val="accent6">
+              <a:lumMod val="75000"/>
+            </a:schemeClr>
+          </a:solidFill>
+          <a:ln w="19050">
+            <a:solidFill>
+              <a:schemeClr val="accent6">
+                <a:lumMod val="75000"/>
+              </a:schemeClr>
+            </a:solidFill>
+          </a:ln>
+          <a:effectLst/>
+        </p:spPr>
+        <p:style>
+          <a:lnRef idx="1">
+            <a:schemeClr val="accent2"/>
+          </a:lnRef>
+          <a:fillRef idx="2">
+            <a:schemeClr val="accent2"/>
+          </a:fillRef>
+          <a:effectRef idx="1">
+            <a:schemeClr val="accent2"/>
+          </a:effectRef>
+          <a:fontRef idx="minor">
+            <a:schemeClr val="dk1"/>
+          </a:fontRef>
+        </p:style>
+        <p:txBody>
+          <a:bodyPr rtlCol="0" anchor="ctr"/>
+          <a:lstStyle/>
+          <a:p>
+            <a:pPr algn="ctr"/>
+            <a:endParaRPr lang="en-SG" sz="1050">
+              <a:solidFill>
+                <a:schemeClr val="bg1"/>
+              </a:solidFill>
+            </a:endParaRPr>
+          </a:p>
+        </p:txBody>
+      </p:sp>
     </p:spTree>
     <p:extLst>
       <p:ext uri="{BB962C8B-B14F-4D97-AF65-F5344CB8AC3E}">

</xml_diff>